<commit_message>
A lot of fixes
* Schemes
* Plots
* Abstract
* Some results (need to remove some)
</commit_message>
<xml_diff>
--- a/Text/Хорунженко_презентация_3_сем.pptx
+++ b/Text/Хорунженко_презентация_3_сем.pptx
@@ -217,7 +217,7 @@
           <a:p>
             <a:fld id="{81248907-F516-46AB-BD86-AD7F77155939}" type="datetimeFigureOut">
               <a:rPr lang="en-US" smtClean="0"/>
-              <a:t>12/26/2023</a:t>
+              <a:t>2/23/2024</a:t>
             </a:fld>
             <a:endParaRPr lang="en-US"/>
           </a:p>
@@ -730,7 +730,7 @@
           <a:p>
             <a:fld id="{2977B670-CD6F-44BD-91AC-635F81E02A72}" type="datetimeFigureOut">
               <a:rPr lang="en-US" smtClean="0"/>
-              <a:t>12/26/2023</a:t>
+              <a:t>2/23/2024</a:t>
             </a:fld>
             <a:endParaRPr lang="en-US"/>
           </a:p>
@@ -928,7 +928,7 @@
           <a:p>
             <a:fld id="{2977B670-CD6F-44BD-91AC-635F81E02A72}" type="datetimeFigureOut">
               <a:rPr lang="en-US" smtClean="0"/>
-              <a:t>12/26/2023</a:t>
+              <a:t>2/23/2024</a:t>
             </a:fld>
             <a:endParaRPr lang="en-US"/>
           </a:p>
@@ -1136,7 +1136,7 @@
           <a:p>
             <a:fld id="{2977B670-CD6F-44BD-91AC-635F81E02A72}" type="datetimeFigureOut">
               <a:rPr lang="en-US" smtClean="0"/>
-              <a:t>12/26/2023</a:t>
+              <a:t>2/23/2024</a:t>
             </a:fld>
             <a:endParaRPr lang="en-US"/>
           </a:p>
@@ -1334,7 +1334,7 @@
           <a:p>
             <a:fld id="{2977B670-CD6F-44BD-91AC-635F81E02A72}" type="datetimeFigureOut">
               <a:rPr lang="en-US" smtClean="0"/>
-              <a:t>12/26/2023</a:t>
+              <a:t>2/23/2024</a:t>
             </a:fld>
             <a:endParaRPr lang="en-US"/>
           </a:p>
@@ -1609,7 +1609,7 @@
           <a:p>
             <a:fld id="{2977B670-CD6F-44BD-91AC-635F81E02A72}" type="datetimeFigureOut">
               <a:rPr lang="en-US" smtClean="0"/>
-              <a:t>12/26/2023</a:t>
+              <a:t>2/23/2024</a:t>
             </a:fld>
             <a:endParaRPr lang="en-US"/>
           </a:p>
@@ -1874,7 +1874,7 @@
           <a:p>
             <a:fld id="{2977B670-CD6F-44BD-91AC-635F81E02A72}" type="datetimeFigureOut">
               <a:rPr lang="en-US" smtClean="0"/>
-              <a:t>12/26/2023</a:t>
+              <a:t>2/23/2024</a:t>
             </a:fld>
             <a:endParaRPr lang="en-US"/>
           </a:p>
@@ -2286,7 +2286,7 @@
           <a:p>
             <a:fld id="{2977B670-CD6F-44BD-91AC-635F81E02A72}" type="datetimeFigureOut">
               <a:rPr lang="en-US" smtClean="0"/>
-              <a:t>12/26/2023</a:t>
+              <a:t>2/23/2024</a:t>
             </a:fld>
             <a:endParaRPr lang="en-US"/>
           </a:p>
@@ -2427,7 +2427,7 @@
           <a:p>
             <a:fld id="{2977B670-CD6F-44BD-91AC-635F81E02A72}" type="datetimeFigureOut">
               <a:rPr lang="en-US" smtClean="0"/>
-              <a:t>12/26/2023</a:t>
+              <a:t>2/23/2024</a:t>
             </a:fld>
             <a:endParaRPr lang="en-US"/>
           </a:p>
@@ -2540,7 +2540,7 @@
           <a:p>
             <a:fld id="{2977B670-CD6F-44BD-91AC-635F81E02A72}" type="datetimeFigureOut">
               <a:rPr lang="en-US" smtClean="0"/>
-              <a:t>12/26/2023</a:t>
+              <a:t>2/23/2024</a:t>
             </a:fld>
             <a:endParaRPr lang="en-US"/>
           </a:p>
@@ -2851,7 +2851,7 @@
           <a:p>
             <a:fld id="{2977B670-CD6F-44BD-91AC-635F81E02A72}" type="datetimeFigureOut">
               <a:rPr lang="en-US" smtClean="0"/>
-              <a:t>12/26/2023</a:t>
+              <a:t>2/23/2024</a:t>
             </a:fld>
             <a:endParaRPr lang="en-US"/>
           </a:p>
@@ -3139,7 +3139,7 @@
           <a:p>
             <a:fld id="{2977B670-CD6F-44BD-91AC-635F81E02A72}" type="datetimeFigureOut">
               <a:rPr lang="en-US" smtClean="0"/>
-              <a:t>12/26/2023</a:t>
+              <a:t>2/23/2024</a:t>
             </a:fld>
             <a:endParaRPr lang="en-US"/>
           </a:p>
@@ -3380,7 +3380,7 @@
           <a:p>
             <a:fld id="{2977B670-CD6F-44BD-91AC-635F81E02A72}" type="datetimeFigureOut">
               <a:rPr lang="en-US" smtClean="0"/>
-              <a:t>12/26/2023</a:t>
+              <a:t>2/23/2024</a:t>
             </a:fld>
             <a:endParaRPr lang="en-US"/>
           </a:p>
@@ -3831,14 +3831,14 @@
                 <a:latin typeface="Times New Roman" panose="02020603050405020304" pitchFamily="18" charset="0"/>
                 <a:ea typeface="Calibri" panose="020F0502020204030204" pitchFamily="34" charset="0"/>
               </a:rPr>
-              <a:t>Исследование эффе</a:t>
+              <a:t>Анализ эффективности нейронны</a:t>
             </a:r>
             <a:r>
               <a:rPr lang="ru-RU" sz="3400" b="1" dirty="0">
                 <a:latin typeface="Times New Roman" panose="02020603050405020304" pitchFamily="18" charset="0"/>
                 <a:ea typeface="Calibri" panose="020F0502020204030204" pitchFamily="34" charset="0"/>
               </a:rPr>
-              <a:t>ктивности </a:t>
+              <a:t>х</a:t>
             </a:r>
             <a:r>
               <a:rPr lang="ru-RU" sz="3400" b="1" dirty="0">
@@ -3846,7 +3846,7 @@
                 <a:latin typeface="Times New Roman" panose="02020603050405020304" pitchFamily="18" charset="0"/>
                 <a:ea typeface="Calibri" panose="020F0502020204030204" pitchFamily="34" charset="0"/>
               </a:rPr>
-              <a:t>нейронных сетей для прогнозирования финансовых временных рядов</a:t>
+              <a:t> сетей для среднесрочного прогнозирования временных рядов разных частот</a:t>
             </a:r>
             <a:endParaRPr lang="en-US" sz="3400" b="1" dirty="0"/>
           </a:p>
@@ -14729,33 +14729,7 @@
                 <a:cs typeface="Times New Roman" panose="02020603050405020304" pitchFamily="18" charset="0"/>
                 <a:hlinkClick r:id="rId2"/>
               </a:rPr>
-              <a:t>https://www.finam.ru/profile/fyuchersy-usa/nq-100</a:t>
-            </a:r>
-            <a:r>
-              <a:rPr lang="ru-RU" sz="770" u="sng" dirty="0">
-                <a:solidFill>
-                  <a:srgbClr val="0000FF"/>
-                </a:solidFill>
-                <a:effectLst/>
-                <a:latin typeface="Times New Roman" panose="02020603050405020304" pitchFamily="18" charset="0"/>
-                <a:ea typeface="Calibri" panose="020F0502020204030204" pitchFamily="34" charset="0"/>
-                <a:cs typeface="Times New Roman" panose="02020603050405020304" pitchFamily="18" charset="0"/>
-                <a:hlinkClick r:id="rId2"/>
-              </a:rPr>
-              <a:t>-</a:t>
-            </a:r>
-            <a:r>
-              <a:rPr lang="ru-RU" sz="770" u="sng" dirty="0">
-                <a:solidFill>
-                  <a:srgbClr val="0000FF"/>
-                </a:solidFill>
-                <a:effectLst/>
-                <a:latin typeface="Times New Roman" panose="02020603050405020304" pitchFamily="18" charset="0"/>
-                <a:ea typeface="Calibri" panose="020F0502020204030204" pitchFamily="34" charset="0"/>
-                <a:cs typeface="Times New Roman" panose="02020603050405020304" pitchFamily="18" charset="0"/>
-                <a:hlinkClick r:id="rId2"/>
-              </a:rPr>
-              <a:t>fut/export/?market=7&amp;em=21719&amp;token=&amp;code=NDX&amp;apply=0&amp;df=1&amp;mf=0&amp;yf=2010&amp;from=01.01.2010&amp;dt=1&amp;mt=0&amp;yt=2014&amp;to=01.01.2014&amp;p=2&amp;f=NDX_100101_140101&amp;e=.txt&amp;cn=NDX&amp;dtf=1&amp;tmf=1&amp;MSOR=1&amp;mstime=on&amp;mstimever=1&amp;sep=1&amp;sep2=1&amp;datf=1&amp;at=1</a:t>
+              <a:t>https://www.finam.ru/profile/fyuchersy-usa/nq-100-fut/export/?market=7&amp;em=21719&amp;token=&amp;code=NDX&amp;apply=0&amp;df=1&amp;mf=0&amp;yf=2010&amp;from=01.01.2010&amp;dt=1&amp;mt=0&amp;yt=2014&amp;to=01.01.2014&amp;p=2&amp;f=NDX_100101_140101&amp;e=.txt&amp;cn=NDX&amp;dtf=1&amp;tmf=1&amp;MSOR=1&amp;mstime=on&amp;mstimever=1&amp;sep=1&amp;sep2=1&amp;datf=1&amp;at=1</a:t>
             </a:r>
             <a:endParaRPr lang="en-US" sz="770" dirty="0">
               <a:effectLst/>
@@ -18255,8 +18229,8 @@
           </a:p>
         </p:txBody>
       </p:sp>
-      <mc:AlternateContent xmlns:mc="http://schemas.openxmlformats.org/markup-compatibility/2006" xmlns:a14="http://schemas.microsoft.com/office/drawing/2010/main">
-        <mc:Choice Requires="a14">
+      <mc:AlternateContent xmlns:mc="http://schemas.openxmlformats.org/markup-compatibility/2006">
+        <mc:Choice xmlns:a14="http://schemas.microsoft.com/office/drawing/2010/main" Requires="a14">
           <p:sp>
             <p:nvSpPr>
               <p:cNvPr id="19" name="TextBox 18">
@@ -18271,7 +18245,7 @@
             </p:nvSpPr>
             <p:spPr>
               <a:xfrm>
-                <a:off x="706358" y="2018353"/>
+                <a:off x="4755844" y="2238047"/>
                 <a:ext cx="2623127" cy="848566"/>
               </a:xfrm>
               <a:prstGeom prst="rect">
@@ -18483,7 +18457,7 @@
             </p:txBody>
           </p:sp>
         </mc:Choice>
-        <mc:Fallback xmlns="">
+        <mc:Fallback>
           <p:sp>
             <p:nvSpPr>
               <p:cNvPr id="19" name="TextBox 18">
@@ -18500,7 +18474,7 @@
             </p:nvSpPr>
             <p:spPr>
               <a:xfrm>
-                <a:off x="706358" y="2018353"/>
+                <a:off x="4755844" y="2238047"/>
                 <a:ext cx="2623127" cy="848566"/>
               </a:xfrm>
               <a:prstGeom prst="rect">
@@ -18542,7 +18516,7 @@
         </p:nvSpPr>
         <p:spPr>
           <a:xfrm>
-            <a:off x="578790" y="2896026"/>
+            <a:off x="4628276" y="3115720"/>
             <a:ext cx="2887201" cy="369332"/>
           </a:xfrm>
           <a:prstGeom prst="rect">
@@ -18568,8 +18542,8 @@
           </a:p>
         </p:txBody>
       </p:sp>
-      <mc:AlternateContent xmlns:mc="http://schemas.openxmlformats.org/markup-compatibility/2006" xmlns:a14="http://schemas.microsoft.com/office/drawing/2010/main">
-        <mc:Choice Requires="a14">
+      <mc:AlternateContent xmlns:mc="http://schemas.openxmlformats.org/markup-compatibility/2006">
+        <mc:Choice xmlns:a14="http://schemas.microsoft.com/office/drawing/2010/main" Requires="a14">
           <p:sp>
             <p:nvSpPr>
               <p:cNvPr id="20" name="TextBox 19">
@@ -18584,7 +18558,7 @@
             </p:nvSpPr>
             <p:spPr>
               <a:xfrm>
-                <a:off x="277457" y="3587294"/>
+                <a:off x="4326943" y="3806988"/>
                 <a:ext cx="3706511" cy="848566"/>
               </a:xfrm>
               <a:prstGeom prst="rect">
@@ -18905,7 +18879,7 @@
             </p:txBody>
           </p:sp>
         </mc:Choice>
-        <mc:Fallback xmlns="">
+        <mc:Fallback>
           <p:sp>
             <p:nvSpPr>
               <p:cNvPr id="20" name="TextBox 19">
@@ -18922,7 +18896,7 @@
             </p:nvSpPr>
             <p:spPr>
               <a:xfrm>
-                <a:off x="277457" y="3587294"/>
+                <a:off x="4326943" y="3806988"/>
                 <a:ext cx="3706511" cy="848566"/>
               </a:xfrm>
               <a:prstGeom prst="rect">
@@ -18964,7 +18938,7 @@
         </p:nvSpPr>
         <p:spPr>
           <a:xfrm>
-            <a:off x="1631438" y="4444951"/>
+            <a:off x="5680924" y="4664645"/>
             <a:ext cx="772969" cy="369332"/>
           </a:xfrm>
           <a:prstGeom prst="rect">
@@ -18985,8 +18959,8 @@
           </a:p>
         </p:txBody>
       </p:sp>
-      <mc:AlternateContent xmlns:mc="http://schemas.openxmlformats.org/markup-compatibility/2006" xmlns:a14="http://schemas.microsoft.com/office/drawing/2010/main">
-        <mc:Choice Requires="a14">
+      <mc:AlternateContent xmlns:mc="http://schemas.openxmlformats.org/markup-compatibility/2006">
+        <mc:Choice xmlns:a14="http://schemas.microsoft.com/office/drawing/2010/main" Requires="a14">
           <p:sp>
             <p:nvSpPr>
               <p:cNvPr id="23" name="TextBox 22">
@@ -19001,7 +18975,7 @@
             </p:nvSpPr>
             <p:spPr>
               <a:xfrm>
-                <a:off x="101705" y="4942462"/>
+                <a:off x="4151191" y="5162156"/>
                 <a:ext cx="4058016" cy="848566"/>
               </a:xfrm>
               <a:prstGeom prst="rect">
@@ -19353,7 +19327,7 @@
             </p:txBody>
           </p:sp>
         </mc:Choice>
-        <mc:Fallback xmlns="">
+        <mc:Fallback>
           <p:sp>
             <p:nvSpPr>
               <p:cNvPr id="23" name="TextBox 22">
@@ -19370,7 +19344,7 @@
             </p:nvSpPr>
             <p:spPr>
               <a:xfrm>
-                <a:off x="101705" y="4942462"/>
+                <a:off x="4151191" y="5162156"/>
                 <a:ext cx="4058016" cy="848566"/>
               </a:xfrm>
               <a:prstGeom prst="rect">
@@ -19412,7 +19386,7 @@
         </p:nvSpPr>
         <p:spPr>
           <a:xfrm>
-            <a:off x="1602585" y="5752724"/>
+            <a:off x="5652071" y="5972418"/>
             <a:ext cx="830677" cy="369332"/>
           </a:xfrm>
           <a:prstGeom prst="rect">
@@ -19429,1273 +19403,6 @@
             <a:r>
               <a:rPr lang="en-US" dirty="0"/>
               <a:t>ARIMA</a:t>
-            </a:r>
-          </a:p>
-        </p:txBody>
-      </p:sp>
-      <mc:AlternateContent xmlns:mc="http://schemas.openxmlformats.org/markup-compatibility/2006" xmlns:a14="http://schemas.microsoft.com/office/drawing/2010/main">
-        <mc:Choice Requires="a14">
-          <p:sp>
-            <p:nvSpPr>
-              <p:cNvPr id="26" name="TextBox 25">
-                <a:extLst>
-                  <a:ext uri="{FF2B5EF4-FFF2-40B4-BE49-F238E27FC236}">
-                    <a16:creationId xmlns:a16="http://schemas.microsoft.com/office/drawing/2014/main" id="{41AF8E55-8DE6-4E74-A197-1C44F3AB45E7}"/>
-                  </a:ext>
-                </a:extLst>
-              </p:cNvPr>
-              <p:cNvSpPr txBox="1"/>
-              <p:nvPr/>
-            </p:nvSpPr>
-            <p:spPr>
-              <a:xfrm>
-                <a:off x="6770253" y="2018353"/>
-                <a:ext cx="3424621" cy="818494"/>
-              </a:xfrm>
-              <a:prstGeom prst="rect">
-                <a:avLst/>
-              </a:prstGeom>
-              <a:noFill/>
-            </p:spPr>
-            <p:txBody>
-              <a:bodyPr wrap="square">
-                <a:spAutoFit/>
-              </a:bodyPr>
-              <a:lstStyle/>
-              <a:p>
-                <a:pPr marL="0" marR="0" indent="0" algn="just">
-                  <a:lnSpc>
-                    <a:spcPct val="150000"/>
-                  </a:lnSpc>
-                  <a:spcBef>
-                    <a:spcPts val="0"/>
-                  </a:spcBef>
-                  <a:spcAft>
-                    <a:spcPts val="0"/>
-                  </a:spcAft>
-                </a:pPr>
-                <a14:m>
-                  <m:oMathPara xmlns:m="http://schemas.openxmlformats.org/officeDocument/2006/math">
-                    <m:oMathParaPr>
-                      <m:jc m:val="centerGroup"/>
-                    </m:oMathParaPr>
-                    <m:oMath xmlns:m="http://schemas.openxmlformats.org/officeDocument/2006/math">
-                      <m:sSub>
-                        <m:sSubPr>
-                          <m:ctrlPr>
-                            <a:rPr lang="en-US" sz="1800" i="1" smtClean="0">
-                              <a:solidFill>
-                                <a:srgbClr val="000000"/>
-                              </a:solidFill>
-                              <a:effectLst/>
-                              <a:latin typeface="Cambria Math" panose="02040503050406030204" pitchFamily="18" charset="0"/>
-                              <a:ea typeface="Calibri" panose="020F0502020204030204" pitchFamily="34" charset="0"/>
-                              <a:cs typeface="Times New Roman" panose="02020603050405020304" pitchFamily="18" charset="0"/>
-                            </a:rPr>
-                          </m:ctrlPr>
-                        </m:sSubPr>
-                        <m:e>
-                          <m:r>
-                            <a:rPr lang="ru-RU" sz="1800" i="1">
-                              <a:solidFill>
-                                <a:srgbClr val="000000"/>
-                              </a:solidFill>
-                              <a:effectLst/>
-                              <a:latin typeface="Cambria Math" panose="02040503050406030204" pitchFamily="18" charset="0"/>
-                              <a:ea typeface="Calibri" panose="020F0502020204030204" pitchFamily="34" charset="0"/>
-                              <a:cs typeface="Times New Roman" panose="02020603050405020304" pitchFamily="18" charset="0"/>
-                            </a:rPr>
-                            <m:t>𝑥</m:t>
-                          </m:r>
-                        </m:e>
-                        <m:sub>
-                          <m:r>
-                            <a:rPr lang="ru-RU" sz="1800" i="1">
-                              <a:solidFill>
-                                <a:srgbClr val="000000"/>
-                              </a:solidFill>
-                              <a:effectLst/>
-                              <a:latin typeface="Cambria Math" panose="02040503050406030204" pitchFamily="18" charset="0"/>
-                              <a:ea typeface="Calibri" panose="020F0502020204030204" pitchFamily="34" charset="0"/>
-                              <a:cs typeface="Times New Roman" panose="02020603050405020304" pitchFamily="18" charset="0"/>
-                            </a:rPr>
-                            <m:t>𝑡</m:t>
-                          </m:r>
-                        </m:sub>
-                      </m:sSub>
-                      <m:r>
-                        <a:rPr lang="ru-RU" sz="1800" i="1">
-                          <a:solidFill>
-                            <a:srgbClr val="000000"/>
-                          </a:solidFill>
-                          <a:effectLst/>
-                          <a:latin typeface="Cambria Math" panose="02040503050406030204" pitchFamily="18" charset="0"/>
-                          <a:ea typeface="Calibri" panose="020F0502020204030204" pitchFamily="34" charset="0"/>
-                          <a:cs typeface="Times New Roman" panose="02020603050405020304" pitchFamily="18" charset="0"/>
-                        </a:rPr>
-                        <m:t>=</m:t>
-                      </m:r>
-                      <m:sSub>
-                        <m:sSubPr>
-                          <m:ctrlPr>
-                            <a:rPr lang="en-US" sz="1800" i="1">
-                              <a:solidFill>
-                                <a:srgbClr val="000000"/>
-                              </a:solidFill>
-                              <a:effectLst/>
-                              <a:latin typeface="Cambria Math" panose="02040503050406030204" pitchFamily="18" charset="0"/>
-                              <a:ea typeface="Calibri" panose="020F0502020204030204" pitchFamily="34" charset="0"/>
-                              <a:cs typeface="Times New Roman" panose="02020603050405020304" pitchFamily="18" charset="0"/>
-                            </a:rPr>
-                          </m:ctrlPr>
-                        </m:sSubPr>
-                        <m:e>
-                          <m:r>
-                            <a:rPr lang="ru-RU" sz="1800" i="1">
-                              <a:solidFill>
-                                <a:srgbClr val="000000"/>
-                              </a:solidFill>
-                              <a:effectLst/>
-                              <a:latin typeface="Cambria Math" panose="02040503050406030204" pitchFamily="18" charset="0"/>
-                              <a:ea typeface="Calibri" panose="020F0502020204030204" pitchFamily="34" charset="0"/>
-                              <a:cs typeface="Times New Roman" panose="02020603050405020304" pitchFamily="18" charset="0"/>
-                            </a:rPr>
-                            <m:t>𝜎</m:t>
-                          </m:r>
-                        </m:e>
-                        <m:sub>
-                          <m:r>
-                            <a:rPr lang="ru-RU" sz="1800" i="1">
-                              <a:solidFill>
-                                <a:srgbClr val="000000"/>
-                              </a:solidFill>
-                              <a:effectLst/>
-                              <a:latin typeface="Cambria Math" panose="02040503050406030204" pitchFamily="18" charset="0"/>
-                              <a:ea typeface="Calibri" panose="020F0502020204030204" pitchFamily="34" charset="0"/>
-                              <a:cs typeface="Times New Roman" panose="02020603050405020304" pitchFamily="18" charset="0"/>
-                            </a:rPr>
-                            <m:t>𝑡</m:t>
-                          </m:r>
-                        </m:sub>
-                      </m:sSub>
-                      <m:sSub>
-                        <m:sSubPr>
-                          <m:ctrlPr>
-                            <a:rPr lang="en-US" sz="1800" i="1">
-                              <a:solidFill>
-                                <a:srgbClr val="000000"/>
-                              </a:solidFill>
-                              <a:effectLst/>
-                              <a:latin typeface="Cambria Math" panose="02040503050406030204" pitchFamily="18" charset="0"/>
-                              <a:ea typeface="Calibri" panose="020F0502020204030204" pitchFamily="34" charset="0"/>
-                              <a:cs typeface="Times New Roman" panose="02020603050405020304" pitchFamily="18" charset="0"/>
-                            </a:rPr>
-                          </m:ctrlPr>
-                        </m:sSubPr>
-                        <m:e>
-                          <m:r>
-                            <a:rPr lang="ru-RU" sz="1800" i="1">
-                              <a:solidFill>
-                                <a:srgbClr val="000000"/>
-                              </a:solidFill>
-                              <a:effectLst/>
-                              <a:latin typeface="Cambria Math" panose="02040503050406030204" pitchFamily="18" charset="0"/>
-                              <a:ea typeface="Calibri" panose="020F0502020204030204" pitchFamily="34" charset="0"/>
-                              <a:cs typeface="Times New Roman" panose="02020603050405020304" pitchFamily="18" charset="0"/>
-                            </a:rPr>
-                            <m:t>𝑒</m:t>
-                          </m:r>
-                        </m:e>
-                        <m:sub>
-                          <m:r>
-                            <a:rPr lang="ru-RU" sz="1800" i="1">
-                              <a:solidFill>
-                                <a:srgbClr val="000000"/>
-                              </a:solidFill>
-                              <a:effectLst/>
-                              <a:latin typeface="Cambria Math" panose="02040503050406030204" pitchFamily="18" charset="0"/>
-                              <a:ea typeface="Calibri" panose="020F0502020204030204" pitchFamily="34" charset="0"/>
-                              <a:cs typeface="Times New Roman" panose="02020603050405020304" pitchFamily="18" charset="0"/>
-                            </a:rPr>
-                            <m:t>𝑡</m:t>
-                          </m:r>
-                        </m:sub>
-                      </m:sSub>
-                    </m:oMath>
-                  </m:oMathPara>
-                </a14:m>
-                <a:endParaRPr lang="en-US" sz="1800" dirty="0">
-                  <a:solidFill>
-                    <a:srgbClr val="000000"/>
-                  </a:solidFill>
-                  <a:effectLst/>
-                  <a:latin typeface="Times New Roman" panose="02020603050405020304" pitchFamily="18" charset="0"/>
-                  <a:ea typeface="Calibri" panose="020F0502020204030204" pitchFamily="34" charset="0"/>
-                  <a:cs typeface="Times New Roman" panose="02020603050405020304" pitchFamily="18" charset="0"/>
-                </a:endParaRPr>
-              </a:p>
-              <a:p>
-                <a:pPr/>
-                <a14:m>
-                  <m:oMathPara xmlns:m="http://schemas.openxmlformats.org/officeDocument/2006/math">
-                    <m:oMathParaPr>
-                      <m:jc m:val="centerGroup"/>
-                    </m:oMathParaPr>
-                    <m:oMath xmlns:m="http://schemas.openxmlformats.org/officeDocument/2006/math">
-                      <m:sSubSup>
-                        <m:sSubSupPr>
-                          <m:ctrlPr>
-                            <a:rPr lang="en-US" i="1">
-                              <a:effectLst/>
-                              <a:latin typeface="Cambria Math" panose="02040503050406030204" pitchFamily="18" charset="0"/>
-                            </a:rPr>
-                          </m:ctrlPr>
-                        </m:sSubSupPr>
-                        <m:e>
-                          <m:r>
-                            <a:rPr lang="ru-RU" sz="1800" i="1">
-                              <a:solidFill>
-                                <a:srgbClr val="000000"/>
-                              </a:solidFill>
-                              <a:effectLst/>
-                              <a:latin typeface="Cambria Math" panose="02040503050406030204" pitchFamily="18" charset="0"/>
-                              <a:ea typeface="Calibri" panose="020F0502020204030204" pitchFamily="34" charset="0"/>
-                              <a:cs typeface="Times New Roman" panose="02020603050405020304" pitchFamily="18" charset="0"/>
-                            </a:rPr>
-                            <m:t>𝜎</m:t>
-                          </m:r>
-                        </m:e>
-                        <m:sub>
-                          <m:r>
-                            <a:rPr lang="ru-RU" sz="1800" i="1">
-                              <a:solidFill>
-                                <a:srgbClr val="000000"/>
-                              </a:solidFill>
-                              <a:effectLst/>
-                              <a:latin typeface="Cambria Math" panose="02040503050406030204" pitchFamily="18" charset="0"/>
-                              <a:ea typeface="Calibri" panose="020F0502020204030204" pitchFamily="34" charset="0"/>
-                              <a:cs typeface="Times New Roman" panose="02020603050405020304" pitchFamily="18" charset="0"/>
-                            </a:rPr>
-                            <m:t>𝑡</m:t>
-                          </m:r>
-                        </m:sub>
-                        <m:sup>
-                          <m:r>
-                            <a:rPr lang="ru-RU" sz="1800" i="1">
-                              <a:solidFill>
-                                <a:srgbClr val="000000"/>
-                              </a:solidFill>
-                              <a:effectLst/>
-                              <a:latin typeface="Cambria Math" panose="02040503050406030204" pitchFamily="18" charset="0"/>
-                              <a:ea typeface="Calibri" panose="020F0502020204030204" pitchFamily="34" charset="0"/>
-                              <a:cs typeface="Times New Roman" panose="02020603050405020304" pitchFamily="18" charset="0"/>
-                            </a:rPr>
-                            <m:t>2</m:t>
-                          </m:r>
-                        </m:sup>
-                      </m:sSubSup>
-                      <m:r>
-                        <a:rPr lang="ru-RU" sz="1800" i="1">
-                          <a:solidFill>
-                            <a:srgbClr val="000000"/>
-                          </a:solidFill>
-                          <a:effectLst/>
-                          <a:latin typeface="Cambria Math" panose="02040503050406030204" pitchFamily="18" charset="0"/>
-                          <a:ea typeface="Calibri" panose="020F0502020204030204" pitchFamily="34" charset="0"/>
-                          <a:cs typeface="Times New Roman" panose="02020603050405020304" pitchFamily="18" charset="0"/>
-                        </a:rPr>
-                        <m:t>=</m:t>
-                      </m:r>
-                      <m:sSub>
-                        <m:sSubPr>
-                          <m:ctrlPr>
-                            <a:rPr lang="en-US" i="1">
-                              <a:effectLst/>
-                              <a:latin typeface="Cambria Math" panose="02040503050406030204" pitchFamily="18" charset="0"/>
-                            </a:rPr>
-                          </m:ctrlPr>
-                        </m:sSubPr>
-                        <m:e>
-                          <m:r>
-                            <a:rPr lang="ru-RU" sz="1800" i="1">
-                              <a:solidFill>
-                                <a:srgbClr val="000000"/>
-                              </a:solidFill>
-                              <a:effectLst/>
-                              <a:latin typeface="Cambria Math" panose="02040503050406030204" pitchFamily="18" charset="0"/>
-                              <a:ea typeface="Calibri" panose="020F0502020204030204" pitchFamily="34" charset="0"/>
-                              <a:cs typeface="Times New Roman" panose="02020603050405020304" pitchFamily="18" charset="0"/>
-                            </a:rPr>
-                            <m:t>𝑎</m:t>
-                          </m:r>
-                        </m:e>
-                        <m:sub>
-                          <m:r>
-                            <a:rPr lang="ru-RU" sz="1800" i="1">
-                              <a:solidFill>
-                                <a:srgbClr val="000000"/>
-                              </a:solidFill>
-                              <a:effectLst/>
-                              <a:latin typeface="Cambria Math" panose="02040503050406030204" pitchFamily="18" charset="0"/>
-                              <a:ea typeface="Calibri" panose="020F0502020204030204" pitchFamily="34" charset="0"/>
-                              <a:cs typeface="Times New Roman" panose="02020603050405020304" pitchFamily="18" charset="0"/>
-                            </a:rPr>
-                            <m:t>0</m:t>
-                          </m:r>
-                        </m:sub>
-                      </m:sSub>
-                      <m:r>
-                        <a:rPr lang="ru-RU" sz="1800" i="1">
-                          <a:solidFill>
-                            <a:srgbClr val="000000"/>
-                          </a:solidFill>
-                          <a:effectLst/>
-                          <a:latin typeface="Cambria Math" panose="02040503050406030204" pitchFamily="18" charset="0"/>
-                          <a:ea typeface="Calibri" panose="020F0502020204030204" pitchFamily="34" charset="0"/>
-                          <a:cs typeface="Times New Roman" panose="02020603050405020304" pitchFamily="18" charset="0"/>
-                        </a:rPr>
-                        <m:t>+</m:t>
-                      </m:r>
-                      <m:sSub>
-                        <m:sSubPr>
-                          <m:ctrlPr>
-                            <a:rPr lang="en-US" i="1">
-                              <a:effectLst/>
-                              <a:latin typeface="Cambria Math" panose="02040503050406030204" pitchFamily="18" charset="0"/>
-                            </a:rPr>
-                          </m:ctrlPr>
-                        </m:sSubPr>
-                        <m:e>
-                          <m:r>
-                            <a:rPr lang="ru-RU" sz="1800" i="1">
-                              <a:solidFill>
-                                <a:srgbClr val="000000"/>
-                              </a:solidFill>
-                              <a:effectLst/>
-                              <a:latin typeface="Cambria Math" panose="02040503050406030204" pitchFamily="18" charset="0"/>
-                              <a:ea typeface="Calibri" panose="020F0502020204030204" pitchFamily="34" charset="0"/>
-                              <a:cs typeface="Times New Roman" panose="02020603050405020304" pitchFamily="18" charset="0"/>
-                            </a:rPr>
-                            <m:t>𝑎</m:t>
-                          </m:r>
-                        </m:e>
-                        <m:sub>
-                          <m:r>
-                            <a:rPr lang="ru-RU" sz="1800" i="1">
-                              <a:solidFill>
-                                <a:srgbClr val="000000"/>
-                              </a:solidFill>
-                              <a:effectLst/>
-                              <a:latin typeface="Cambria Math" panose="02040503050406030204" pitchFamily="18" charset="0"/>
-                              <a:ea typeface="Calibri" panose="020F0502020204030204" pitchFamily="34" charset="0"/>
-                              <a:cs typeface="Times New Roman" panose="02020603050405020304" pitchFamily="18" charset="0"/>
-                            </a:rPr>
-                            <m:t>1</m:t>
-                          </m:r>
-                        </m:sub>
-                      </m:sSub>
-                      <m:sSubSup>
-                        <m:sSubSupPr>
-                          <m:ctrlPr>
-                            <a:rPr lang="en-US" i="1">
-                              <a:effectLst/>
-                              <a:latin typeface="Cambria Math" panose="02040503050406030204" pitchFamily="18" charset="0"/>
-                            </a:rPr>
-                          </m:ctrlPr>
-                        </m:sSubSupPr>
-                        <m:e>
-                          <m:r>
-                            <a:rPr lang="ru-RU" sz="1800" i="1">
-                              <a:solidFill>
-                                <a:srgbClr val="000000"/>
-                              </a:solidFill>
-                              <a:effectLst/>
-                              <a:latin typeface="Cambria Math" panose="02040503050406030204" pitchFamily="18" charset="0"/>
-                              <a:ea typeface="Calibri" panose="020F0502020204030204" pitchFamily="34" charset="0"/>
-                              <a:cs typeface="Times New Roman" panose="02020603050405020304" pitchFamily="18" charset="0"/>
-                            </a:rPr>
-                            <m:t>𝑥</m:t>
-                          </m:r>
-                        </m:e>
-                        <m:sub>
-                          <m:r>
-                            <a:rPr lang="ru-RU" sz="1800" i="1">
-                              <a:solidFill>
-                                <a:srgbClr val="000000"/>
-                              </a:solidFill>
-                              <a:effectLst/>
-                              <a:latin typeface="Cambria Math" panose="02040503050406030204" pitchFamily="18" charset="0"/>
-                              <a:ea typeface="Calibri" panose="020F0502020204030204" pitchFamily="34" charset="0"/>
-                              <a:cs typeface="Times New Roman" panose="02020603050405020304" pitchFamily="18" charset="0"/>
-                            </a:rPr>
-                            <m:t>𝑡</m:t>
-                          </m:r>
-                          <m:r>
-                            <a:rPr lang="ru-RU" sz="1800" i="1">
-                              <a:solidFill>
-                                <a:srgbClr val="000000"/>
-                              </a:solidFill>
-                              <a:effectLst/>
-                              <a:latin typeface="Cambria Math" panose="02040503050406030204" pitchFamily="18" charset="0"/>
-                              <a:ea typeface="Calibri" panose="020F0502020204030204" pitchFamily="34" charset="0"/>
-                              <a:cs typeface="Times New Roman" panose="02020603050405020304" pitchFamily="18" charset="0"/>
-                            </a:rPr>
-                            <m:t>−1</m:t>
-                          </m:r>
-                        </m:sub>
-                        <m:sup>
-                          <m:r>
-                            <a:rPr lang="ru-RU" sz="1800" i="1">
-                              <a:solidFill>
-                                <a:srgbClr val="000000"/>
-                              </a:solidFill>
-                              <a:effectLst/>
-                              <a:latin typeface="Cambria Math" panose="02040503050406030204" pitchFamily="18" charset="0"/>
-                              <a:ea typeface="Calibri" panose="020F0502020204030204" pitchFamily="34" charset="0"/>
-                              <a:cs typeface="Times New Roman" panose="02020603050405020304" pitchFamily="18" charset="0"/>
-                            </a:rPr>
-                            <m:t>2</m:t>
-                          </m:r>
-                        </m:sup>
-                      </m:sSubSup>
-                      <m:r>
-                        <a:rPr lang="ru-RU" sz="1800" i="1">
-                          <a:solidFill>
-                            <a:srgbClr val="000000"/>
-                          </a:solidFill>
-                          <a:effectLst/>
-                          <a:latin typeface="Cambria Math" panose="02040503050406030204" pitchFamily="18" charset="0"/>
-                          <a:ea typeface="Times New Roman" panose="02020603050405020304" pitchFamily="18" charset="0"/>
-                          <a:cs typeface="Times New Roman" panose="02020603050405020304" pitchFamily="18" charset="0"/>
-                        </a:rPr>
-                        <m:t>+…+</m:t>
-                      </m:r>
-                      <m:sSub>
-                        <m:sSubPr>
-                          <m:ctrlPr>
-                            <a:rPr lang="en-US" i="1">
-                              <a:effectLst/>
-                              <a:latin typeface="Cambria Math" panose="02040503050406030204" pitchFamily="18" charset="0"/>
-                            </a:rPr>
-                          </m:ctrlPr>
-                        </m:sSubPr>
-                        <m:e>
-                          <m:r>
-                            <a:rPr lang="ru-RU" sz="1800" i="1">
-                              <a:solidFill>
-                                <a:srgbClr val="000000"/>
-                              </a:solidFill>
-                              <a:effectLst/>
-                              <a:latin typeface="Cambria Math" panose="02040503050406030204" pitchFamily="18" charset="0"/>
-                              <a:ea typeface="Calibri" panose="020F0502020204030204" pitchFamily="34" charset="0"/>
-                              <a:cs typeface="Times New Roman" panose="02020603050405020304" pitchFamily="18" charset="0"/>
-                            </a:rPr>
-                            <m:t>𝑎</m:t>
-                          </m:r>
-                        </m:e>
-                        <m:sub>
-                          <m:r>
-                            <a:rPr lang="ru-RU" sz="1800" i="1">
-                              <a:solidFill>
-                                <a:srgbClr val="000000"/>
-                              </a:solidFill>
-                              <a:effectLst/>
-                              <a:latin typeface="Cambria Math" panose="02040503050406030204" pitchFamily="18" charset="0"/>
-                              <a:ea typeface="Calibri" panose="020F0502020204030204" pitchFamily="34" charset="0"/>
-                              <a:cs typeface="Times New Roman" panose="02020603050405020304" pitchFamily="18" charset="0"/>
-                            </a:rPr>
-                            <m:t>𝑝</m:t>
-                          </m:r>
-                        </m:sub>
-                      </m:sSub>
-                      <m:sSubSup>
-                        <m:sSubSupPr>
-                          <m:ctrlPr>
-                            <a:rPr lang="en-US" i="1">
-                              <a:effectLst/>
-                              <a:latin typeface="Cambria Math" panose="02040503050406030204" pitchFamily="18" charset="0"/>
-                            </a:rPr>
-                          </m:ctrlPr>
-                        </m:sSubSupPr>
-                        <m:e>
-                          <m:r>
-                            <a:rPr lang="ru-RU" sz="1800" i="1">
-                              <a:solidFill>
-                                <a:srgbClr val="000000"/>
-                              </a:solidFill>
-                              <a:effectLst/>
-                              <a:latin typeface="Cambria Math" panose="02040503050406030204" pitchFamily="18" charset="0"/>
-                              <a:ea typeface="Calibri" panose="020F0502020204030204" pitchFamily="34" charset="0"/>
-                              <a:cs typeface="Times New Roman" panose="02020603050405020304" pitchFamily="18" charset="0"/>
-                            </a:rPr>
-                            <m:t>𝑥</m:t>
-                          </m:r>
-                        </m:e>
-                        <m:sub>
-                          <m:r>
-                            <a:rPr lang="ru-RU" sz="1800" i="1">
-                              <a:solidFill>
-                                <a:srgbClr val="000000"/>
-                              </a:solidFill>
-                              <a:effectLst/>
-                              <a:latin typeface="Cambria Math" panose="02040503050406030204" pitchFamily="18" charset="0"/>
-                              <a:ea typeface="Calibri" panose="020F0502020204030204" pitchFamily="34" charset="0"/>
-                              <a:cs typeface="Times New Roman" panose="02020603050405020304" pitchFamily="18" charset="0"/>
-                            </a:rPr>
-                            <m:t>𝑡</m:t>
-                          </m:r>
-                          <m:r>
-                            <a:rPr lang="ru-RU" sz="1800" i="1">
-                              <a:solidFill>
-                                <a:srgbClr val="000000"/>
-                              </a:solidFill>
-                              <a:effectLst/>
-                              <a:latin typeface="Cambria Math" panose="02040503050406030204" pitchFamily="18" charset="0"/>
-                              <a:ea typeface="Calibri" panose="020F0502020204030204" pitchFamily="34" charset="0"/>
-                              <a:cs typeface="Times New Roman" panose="02020603050405020304" pitchFamily="18" charset="0"/>
-                            </a:rPr>
-                            <m:t>−</m:t>
-                          </m:r>
-                          <m:r>
-                            <a:rPr lang="ru-RU" sz="1800" i="1">
-                              <a:solidFill>
-                                <a:srgbClr val="000000"/>
-                              </a:solidFill>
-                              <a:effectLst/>
-                              <a:latin typeface="Cambria Math" panose="02040503050406030204" pitchFamily="18" charset="0"/>
-                              <a:ea typeface="Calibri" panose="020F0502020204030204" pitchFamily="34" charset="0"/>
-                              <a:cs typeface="Times New Roman" panose="02020603050405020304" pitchFamily="18" charset="0"/>
-                            </a:rPr>
-                            <m:t>𝑝</m:t>
-                          </m:r>
-                        </m:sub>
-                        <m:sup>
-                          <m:r>
-                            <a:rPr lang="ru-RU" sz="1800" i="1">
-                              <a:solidFill>
-                                <a:srgbClr val="000000"/>
-                              </a:solidFill>
-                              <a:effectLst/>
-                              <a:latin typeface="Cambria Math" panose="02040503050406030204" pitchFamily="18" charset="0"/>
-                              <a:ea typeface="Calibri" panose="020F0502020204030204" pitchFamily="34" charset="0"/>
-                              <a:cs typeface="Times New Roman" panose="02020603050405020304" pitchFamily="18" charset="0"/>
-                            </a:rPr>
-                            <m:t>2</m:t>
-                          </m:r>
-                        </m:sup>
-                      </m:sSubSup>
-                    </m:oMath>
-                  </m:oMathPara>
-                </a14:m>
-                <a:endParaRPr lang="en-US" dirty="0"/>
-              </a:p>
-            </p:txBody>
-          </p:sp>
-        </mc:Choice>
-        <mc:Fallback xmlns="">
-          <p:sp>
-            <p:nvSpPr>
-              <p:cNvPr id="26" name="TextBox 25">
-                <a:extLst>
-                  <a:ext uri="{FF2B5EF4-FFF2-40B4-BE49-F238E27FC236}">
-                    <a16:creationId xmlns:a16="http://schemas.microsoft.com/office/drawing/2014/main" id="{41AF8E55-8DE6-4E74-A197-1C44F3AB45E7}"/>
-                  </a:ext>
-                </a:extLst>
-              </p:cNvPr>
-              <p:cNvSpPr txBox="1">
-                <a:spLocks noRot="1" noChangeAspect="1" noMove="1" noResize="1" noEditPoints="1" noAdjustHandles="1" noChangeArrowheads="1" noChangeShapeType="1" noTextEdit="1"/>
-              </p:cNvSpPr>
-              <p:nvPr/>
-            </p:nvSpPr>
-            <p:spPr>
-              <a:xfrm>
-                <a:off x="6770253" y="2018353"/>
-                <a:ext cx="3424621" cy="818494"/>
-              </a:xfrm>
-              <a:prstGeom prst="rect">
-                <a:avLst/>
-              </a:prstGeom>
-              <a:blipFill>
-                <a:blip r:embed="rId5"/>
-                <a:stretch>
-                  <a:fillRect b="-2239"/>
-                </a:stretch>
-              </a:blipFill>
-            </p:spPr>
-            <p:txBody>
-              <a:bodyPr/>
-              <a:lstStyle/>
-              <a:p>
-                <a:r>
-                  <a:rPr lang="en-US">
-                    <a:noFill/>
-                  </a:rPr>
-                  <a:t> </a:t>
-                </a:r>
-              </a:p>
-            </p:txBody>
-          </p:sp>
-        </mc:Fallback>
-      </mc:AlternateContent>
-      <p:sp>
-        <p:nvSpPr>
-          <p:cNvPr id="22" name="TextBox 21">
-            <a:extLst>
-              <a:ext uri="{FF2B5EF4-FFF2-40B4-BE49-F238E27FC236}">
-                <a16:creationId xmlns:a16="http://schemas.microsoft.com/office/drawing/2014/main" id="{C380E1A6-A61B-4717-8C51-1C325C4EAEA8}"/>
-              </a:ext>
-            </a:extLst>
-          </p:cNvPr>
-          <p:cNvSpPr txBox="1"/>
-          <p:nvPr/>
-        </p:nvSpPr>
-        <p:spPr>
-          <a:xfrm>
-            <a:off x="8128363" y="2855030"/>
-            <a:ext cx="708399" cy="369332"/>
-          </a:xfrm>
-          <a:prstGeom prst="rect">
-            <a:avLst/>
-          </a:prstGeom>
-          <a:noFill/>
-        </p:spPr>
-        <p:txBody>
-          <a:bodyPr wrap="none" rtlCol="0">
-            <a:spAutoFit/>
-          </a:bodyPr>
-          <a:lstStyle/>
-          <a:p>
-            <a:r>
-              <a:rPr lang="en-US" dirty="0"/>
-              <a:t>ARCH</a:t>
-            </a:r>
-          </a:p>
-        </p:txBody>
-      </p:sp>
-      <mc:AlternateContent xmlns:mc="http://schemas.openxmlformats.org/markup-compatibility/2006" xmlns:a14="http://schemas.microsoft.com/office/drawing/2010/main">
-        <mc:Choice Requires="a14">
-          <p:sp>
-            <p:nvSpPr>
-              <p:cNvPr id="29" name="TextBox 28">
-                <a:extLst>
-                  <a:ext uri="{FF2B5EF4-FFF2-40B4-BE49-F238E27FC236}">
-                    <a16:creationId xmlns:a16="http://schemas.microsoft.com/office/drawing/2014/main" id="{9BF045A3-B092-46A4-BD4E-DBB83804F9A5}"/>
-                  </a:ext>
-                </a:extLst>
-              </p:cNvPr>
-              <p:cNvSpPr txBox="1"/>
-              <p:nvPr/>
-            </p:nvSpPr>
-            <p:spPr>
-              <a:xfrm>
-                <a:off x="5379144" y="3332035"/>
-                <a:ext cx="6206836" cy="1667380"/>
-              </a:xfrm>
-              <a:prstGeom prst="rect">
-                <a:avLst/>
-              </a:prstGeom>
-              <a:noFill/>
-            </p:spPr>
-            <p:txBody>
-              <a:bodyPr wrap="square">
-                <a:spAutoFit/>
-              </a:bodyPr>
-              <a:lstStyle/>
-              <a:p>
-                <a:pPr/>
-                <a14:m>
-                  <m:oMathPara xmlns:m="http://schemas.openxmlformats.org/officeDocument/2006/math">
-                    <m:oMathParaPr>
-                      <m:jc m:val="centerGroup"/>
-                    </m:oMathParaPr>
-                    <m:oMath xmlns:m="http://schemas.openxmlformats.org/officeDocument/2006/math">
-                      <m:sSubSup>
-                        <m:sSubSupPr>
-                          <m:ctrlPr>
-                            <a:rPr lang="en-US" i="1" smtClean="0">
-                              <a:solidFill>
-                                <a:srgbClr val="836967"/>
-                              </a:solidFill>
-                              <a:latin typeface="Cambria Math" panose="02040503050406030204" pitchFamily="18" charset="0"/>
-                            </a:rPr>
-                          </m:ctrlPr>
-                        </m:sSubSupPr>
-                        <m:e>
-                          <m:r>
-                            <a:rPr lang="en-US" i="1">
-                              <a:latin typeface="Cambria Math" panose="02040503050406030204" pitchFamily="18" charset="0"/>
-                            </a:rPr>
-                            <m:t>𝜎</m:t>
-                          </m:r>
-                        </m:e>
-                        <m:sub>
-                          <m:r>
-                            <a:rPr lang="en-US" i="1">
-                              <a:latin typeface="Cambria Math" panose="02040503050406030204" pitchFamily="18" charset="0"/>
-                            </a:rPr>
-                            <m:t>𝑡</m:t>
-                          </m:r>
-                        </m:sub>
-                        <m:sup>
-                          <m:r>
-                            <a:rPr lang="en-US" i="0">
-                              <a:latin typeface="Cambria Math" panose="02040503050406030204" pitchFamily="18" charset="0"/>
-                            </a:rPr>
-                            <m:t>2</m:t>
-                          </m:r>
-                        </m:sup>
-                      </m:sSubSup>
-                      <m:r>
-                        <a:rPr lang="en-US" i="0">
-                          <a:latin typeface="Cambria Math" panose="02040503050406030204" pitchFamily="18" charset="0"/>
-                        </a:rPr>
-                        <m:t>=</m:t>
-                      </m:r>
-                      <m:r>
-                        <a:rPr lang="en-US" i="1">
-                          <a:latin typeface="Cambria Math" panose="02040503050406030204" pitchFamily="18" charset="0"/>
-                        </a:rPr>
-                        <m:t>𝜔</m:t>
-                      </m:r>
-                      <m:r>
-                        <a:rPr lang="en-US" i="0">
-                          <a:latin typeface="Cambria Math" panose="02040503050406030204" pitchFamily="18" charset="0"/>
-                        </a:rPr>
-                        <m:t>+</m:t>
-                      </m:r>
-                      <m:nary>
-                        <m:naryPr>
-                          <m:chr m:val="∑"/>
-                          <m:limLoc m:val="undOvr"/>
-                          <m:ctrlPr>
-                            <a:rPr lang="en-US" i="1">
-                              <a:latin typeface="Cambria Math" panose="02040503050406030204" pitchFamily="18" charset="0"/>
-                            </a:rPr>
-                          </m:ctrlPr>
-                        </m:naryPr>
-                        <m:sub>
-                          <m:r>
-                            <a:rPr lang="en-US" i="1">
-                              <a:latin typeface="Cambria Math" panose="02040503050406030204" pitchFamily="18" charset="0"/>
-                            </a:rPr>
-                            <m:t>𝑖</m:t>
-                          </m:r>
-                          <m:r>
-                            <a:rPr lang="en-US" i="0">
-                              <a:latin typeface="Cambria Math" panose="02040503050406030204" pitchFamily="18" charset="0"/>
-                            </a:rPr>
-                            <m:t>=1</m:t>
-                          </m:r>
-                        </m:sub>
-                        <m:sup>
-                          <m:r>
-                            <a:rPr lang="en-US" i="1">
-                              <a:latin typeface="Cambria Math" panose="02040503050406030204" pitchFamily="18" charset="0"/>
-                            </a:rPr>
-                            <m:t>𝑞</m:t>
-                          </m:r>
-                        </m:sup>
-                        <m:e>
-                          <m:sSub>
-                            <m:sSubPr>
-                              <m:ctrlPr>
-                                <a:rPr lang="en-US" i="1">
-                                  <a:solidFill>
-                                    <a:srgbClr val="836967"/>
-                                  </a:solidFill>
-                                  <a:latin typeface="Cambria Math" panose="02040503050406030204" pitchFamily="18" charset="0"/>
-                                </a:rPr>
-                              </m:ctrlPr>
-                            </m:sSubPr>
-                            <m:e>
-                              <m:r>
-                                <a:rPr lang="en-US" i="1">
-                                  <a:latin typeface="Cambria Math" panose="02040503050406030204" pitchFamily="18" charset="0"/>
-                                </a:rPr>
-                                <m:t>𝑎</m:t>
-                              </m:r>
-                            </m:e>
-                            <m:sub>
-                              <m:r>
-                                <a:rPr lang="en-US" i="1">
-                                  <a:latin typeface="Cambria Math" panose="02040503050406030204" pitchFamily="18" charset="0"/>
-                                </a:rPr>
-                                <m:t>𝑖</m:t>
-                              </m:r>
-                            </m:sub>
-                          </m:sSub>
-                          <m:sSubSup>
-                            <m:sSubSupPr>
-                              <m:ctrlPr>
-                                <a:rPr lang="en-US" i="1">
-                                  <a:solidFill>
-                                    <a:srgbClr val="836967"/>
-                                  </a:solidFill>
-                                  <a:latin typeface="Cambria Math" panose="02040503050406030204" pitchFamily="18" charset="0"/>
-                                </a:rPr>
-                              </m:ctrlPr>
-                            </m:sSubSupPr>
-                            <m:e>
-                              <m:r>
-                                <a:rPr lang="en-US" i="1">
-                                  <a:latin typeface="Cambria Math" panose="02040503050406030204" pitchFamily="18" charset="0"/>
-                                </a:rPr>
-                                <m:t>𝑢</m:t>
-                              </m:r>
-                            </m:e>
-                            <m:sub>
-                              <m:r>
-                                <a:rPr lang="en-US" i="1">
-                                  <a:latin typeface="Cambria Math" panose="02040503050406030204" pitchFamily="18" charset="0"/>
-                                </a:rPr>
-                                <m:t>𝑡</m:t>
-                              </m:r>
-                              <m:r>
-                                <a:rPr lang="en-US" i="0">
-                                  <a:latin typeface="Cambria Math" panose="02040503050406030204" pitchFamily="18" charset="0"/>
-                                </a:rPr>
-                                <m:t>−</m:t>
-                              </m:r>
-                              <m:r>
-                                <a:rPr lang="en-US" i="1">
-                                  <a:latin typeface="Cambria Math" panose="02040503050406030204" pitchFamily="18" charset="0"/>
-                                </a:rPr>
-                                <m:t>𝑖</m:t>
-                              </m:r>
-                            </m:sub>
-                            <m:sup>
-                              <m:r>
-                                <a:rPr lang="en-US" i="0">
-                                  <a:latin typeface="Cambria Math" panose="02040503050406030204" pitchFamily="18" charset="0"/>
-                                </a:rPr>
-                                <m:t>2</m:t>
-                              </m:r>
-                            </m:sup>
-                          </m:sSubSup>
-                        </m:e>
-                      </m:nary>
-                      <m:r>
-                        <a:rPr lang="en-US" i="0">
-                          <a:latin typeface="Cambria Math" panose="02040503050406030204" pitchFamily="18" charset="0"/>
-                        </a:rPr>
-                        <m:t>+</m:t>
-                      </m:r>
-                      <m:nary>
-                        <m:naryPr>
-                          <m:chr m:val="∑"/>
-                          <m:limLoc m:val="undOvr"/>
-                          <m:ctrlPr>
-                            <a:rPr lang="en-US" i="1">
-                              <a:latin typeface="Cambria Math" panose="02040503050406030204" pitchFamily="18" charset="0"/>
-                            </a:rPr>
-                          </m:ctrlPr>
-                        </m:naryPr>
-                        <m:sub>
-                          <m:r>
-                            <a:rPr lang="en-US" i="1">
-                              <a:latin typeface="Cambria Math" panose="02040503050406030204" pitchFamily="18" charset="0"/>
-                            </a:rPr>
-                            <m:t>𝑗</m:t>
-                          </m:r>
-                          <m:r>
-                            <a:rPr lang="en-US" i="0">
-                              <a:latin typeface="Cambria Math" panose="02040503050406030204" pitchFamily="18" charset="0"/>
-                            </a:rPr>
-                            <m:t>=1</m:t>
-                          </m:r>
-                        </m:sub>
-                        <m:sup>
-                          <m:r>
-                            <a:rPr lang="en-US" i="1">
-                              <a:latin typeface="Cambria Math" panose="02040503050406030204" pitchFamily="18" charset="0"/>
-                            </a:rPr>
-                            <m:t>𝑝</m:t>
-                          </m:r>
-                        </m:sup>
-                        <m:e>
-                          <m:sSub>
-                            <m:sSubPr>
-                              <m:ctrlPr>
-                                <a:rPr lang="en-US" i="1">
-                                  <a:solidFill>
-                                    <a:srgbClr val="836967"/>
-                                  </a:solidFill>
-                                  <a:latin typeface="Cambria Math" panose="02040503050406030204" pitchFamily="18" charset="0"/>
-                                </a:rPr>
-                              </m:ctrlPr>
-                            </m:sSubPr>
-                            <m:e>
-                              <m:r>
-                                <a:rPr lang="en-US" i="1">
-                                  <a:latin typeface="Cambria Math" panose="02040503050406030204" pitchFamily="18" charset="0"/>
-                                </a:rPr>
-                                <m:t>𝑏</m:t>
-                              </m:r>
-                            </m:e>
-                            <m:sub>
-                              <m:r>
-                                <a:rPr lang="en-US" i="1">
-                                  <a:latin typeface="Cambria Math" panose="02040503050406030204" pitchFamily="18" charset="0"/>
-                                </a:rPr>
-                                <m:t>𝑗</m:t>
-                              </m:r>
-                            </m:sub>
-                          </m:sSub>
-                          <m:sSubSup>
-                            <m:sSubSupPr>
-                              <m:ctrlPr>
-                                <a:rPr lang="en-US" i="1">
-                                  <a:solidFill>
-                                    <a:srgbClr val="836967"/>
-                                  </a:solidFill>
-                                  <a:latin typeface="Cambria Math" panose="02040503050406030204" pitchFamily="18" charset="0"/>
-                                </a:rPr>
-                              </m:ctrlPr>
-                            </m:sSubSupPr>
-                            <m:e>
-                              <m:r>
-                                <a:rPr lang="en-US" i="1">
-                                  <a:latin typeface="Cambria Math" panose="02040503050406030204" pitchFamily="18" charset="0"/>
-                                </a:rPr>
-                                <m:t>𝜎</m:t>
-                              </m:r>
-                            </m:e>
-                            <m:sub>
-                              <m:r>
-                                <a:rPr lang="en-US" i="1">
-                                  <a:latin typeface="Cambria Math" panose="02040503050406030204" pitchFamily="18" charset="0"/>
-                                </a:rPr>
-                                <m:t>𝑡</m:t>
-                              </m:r>
-                              <m:r>
-                                <a:rPr lang="en-US" i="0">
-                                  <a:latin typeface="Cambria Math" panose="02040503050406030204" pitchFamily="18" charset="0"/>
-                                </a:rPr>
-                                <m:t>−</m:t>
-                              </m:r>
-                              <m:r>
-                                <a:rPr lang="en-US" i="1">
-                                  <a:latin typeface="Cambria Math" panose="02040503050406030204" pitchFamily="18" charset="0"/>
-                                </a:rPr>
-                                <m:t>𝑗</m:t>
-                              </m:r>
-                            </m:sub>
-                            <m:sup>
-                              <m:r>
-                                <a:rPr lang="en-US" i="0">
-                                  <a:latin typeface="Cambria Math" panose="02040503050406030204" pitchFamily="18" charset="0"/>
-                                </a:rPr>
-                                <m:t>2</m:t>
-                              </m:r>
-                            </m:sup>
-                          </m:sSubSup>
-                        </m:e>
-                      </m:nary>
-                    </m:oMath>
-                  </m:oMathPara>
-                </a14:m>
-                <a:endParaRPr lang="en-US" dirty="0"/>
-              </a:p>
-              <a:p>
-                <a:pPr/>
-                <a14:m>
-                  <m:oMathPara xmlns:m="http://schemas.openxmlformats.org/officeDocument/2006/math">
-                    <m:oMathParaPr>
-                      <m:jc m:val="centerGroup"/>
-                    </m:oMathParaPr>
-                    <m:oMath xmlns:m="http://schemas.openxmlformats.org/officeDocument/2006/math">
-                      <m:nary>
-                        <m:naryPr>
-                          <m:chr m:val="∑"/>
-                          <m:limLoc m:val="undOvr"/>
-                          <m:ctrlPr>
-                            <a:rPr lang="en-US" i="1" smtClean="0">
-                              <a:effectLst/>
-                              <a:latin typeface="Cambria Math" panose="02040503050406030204" pitchFamily="18" charset="0"/>
-                            </a:rPr>
-                          </m:ctrlPr>
-                        </m:naryPr>
-                        <m:sub>
-                          <m:r>
-                            <a:rPr lang="ru-RU" sz="1800" i="1">
-                              <a:solidFill>
-                                <a:srgbClr val="000000"/>
-                              </a:solidFill>
-                              <a:effectLst/>
-                              <a:latin typeface="Cambria Math" panose="02040503050406030204" pitchFamily="18" charset="0"/>
-                              <a:ea typeface="Calibri" panose="020F0502020204030204" pitchFamily="34" charset="0"/>
-                              <a:cs typeface="Times New Roman" panose="02020603050405020304" pitchFamily="18" charset="0"/>
-                            </a:rPr>
-                            <m:t>𝑖</m:t>
-                          </m:r>
-                          <m:r>
-                            <a:rPr lang="ru-RU" sz="1800" i="1">
-                              <a:solidFill>
-                                <a:srgbClr val="000000"/>
-                              </a:solidFill>
-                              <a:effectLst/>
-                              <a:latin typeface="Cambria Math" panose="02040503050406030204" pitchFamily="18" charset="0"/>
-                              <a:ea typeface="Calibri" panose="020F0502020204030204" pitchFamily="34" charset="0"/>
-                              <a:cs typeface="Times New Roman" panose="02020603050405020304" pitchFamily="18" charset="0"/>
-                            </a:rPr>
-                            <m:t>=1</m:t>
-                          </m:r>
-                        </m:sub>
-                        <m:sup>
-                          <m:r>
-                            <a:rPr lang="ru-RU" sz="1800" i="1">
-                              <a:solidFill>
-                                <a:srgbClr val="000000"/>
-                              </a:solidFill>
-                              <a:effectLst/>
-                              <a:latin typeface="Cambria Math" panose="02040503050406030204" pitchFamily="18" charset="0"/>
-                              <a:ea typeface="Calibri" panose="020F0502020204030204" pitchFamily="34" charset="0"/>
-                              <a:cs typeface="Times New Roman" panose="02020603050405020304" pitchFamily="18" charset="0"/>
-                            </a:rPr>
-                            <m:t>𝑞</m:t>
-                          </m:r>
-                        </m:sup>
-                        <m:e>
-                          <m:sSub>
-                            <m:sSubPr>
-                              <m:ctrlPr>
-                                <a:rPr lang="en-US" i="1">
-                                  <a:effectLst/>
-                                  <a:latin typeface="Cambria Math" panose="02040503050406030204" pitchFamily="18" charset="0"/>
-                                </a:rPr>
-                              </m:ctrlPr>
-                            </m:sSubPr>
-                            <m:e>
-                              <m:r>
-                                <a:rPr lang="ru-RU" sz="1800" i="1">
-                                  <a:solidFill>
-                                    <a:srgbClr val="000000"/>
-                                  </a:solidFill>
-                                  <a:effectLst/>
-                                  <a:latin typeface="Cambria Math" panose="02040503050406030204" pitchFamily="18" charset="0"/>
-                                  <a:ea typeface="Calibri" panose="020F0502020204030204" pitchFamily="34" charset="0"/>
-                                  <a:cs typeface="Times New Roman" panose="02020603050405020304" pitchFamily="18" charset="0"/>
-                                </a:rPr>
-                                <m:t>𝑎</m:t>
-                              </m:r>
-                            </m:e>
-                            <m:sub>
-                              <m:r>
-                                <a:rPr lang="ru-RU" sz="1800" i="1">
-                                  <a:solidFill>
-                                    <a:srgbClr val="000000"/>
-                                  </a:solidFill>
-                                  <a:effectLst/>
-                                  <a:latin typeface="Cambria Math" panose="02040503050406030204" pitchFamily="18" charset="0"/>
-                                  <a:ea typeface="Calibri" panose="020F0502020204030204" pitchFamily="34" charset="0"/>
-                                  <a:cs typeface="Times New Roman" panose="02020603050405020304" pitchFamily="18" charset="0"/>
-                                </a:rPr>
-                                <m:t>𝑖</m:t>
-                              </m:r>
-                            </m:sub>
-                          </m:sSub>
-                        </m:e>
-                      </m:nary>
-                      <m:r>
-                        <a:rPr lang="ru-RU" sz="1800" i="1">
-                          <a:solidFill>
-                            <a:srgbClr val="000000"/>
-                          </a:solidFill>
-                          <a:effectLst/>
-                          <a:latin typeface="Cambria Math" panose="02040503050406030204" pitchFamily="18" charset="0"/>
-                          <a:ea typeface="Calibri" panose="020F0502020204030204" pitchFamily="34" charset="0"/>
-                          <a:cs typeface="Times New Roman" panose="02020603050405020304" pitchFamily="18" charset="0"/>
-                        </a:rPr>
-                        <m:t>+</m:t>
-                      </m:r>
-                      <m:nary>
-                        <m:naryPr>
-                          <m:chr m:val="∑"/>
-                          <m:limLoc m:val="undOvr"/>
-                          <m:ctrlPr>
-                            <a:rPr lang="en-US" i="1">
-                              <a:effectLst/>
-                              <a:latin typeface="Cambria Math" panose="02040503050406030204" pitchFamily="18" charset="0"/>
-                            </a:rPr>
-                          </m:ctrlPr>
-                        </m:naryPr>
-                        <m:sub>
-                          <m:r>
-                            <a:rPr lang="ru-RU" sz="1800" i="1">
-                              <a:solidFill>
-                                <a:srgbClr val="000000"/>
-                              </a:solidFill>
-                              <a:effectLst/>
-                              <a:latin typeface="Cambria Math" panose="02040503050406030204" pitchFamily="18" charset="0"/>
-                              <a:ea typeface="Calibri" panose="020F0502020204030204" pitchFamily="34" charset="0"/>
-                              <a:cs typeface="Times New Roman" panose="02020603050405020304" pitchFamily="18" charset="0"/>
-                            </a:rPr>
-                            <m:t>𝑗</m:t>
-                          </m:r>
-                          <m:r>
-                            <a:rPr lang="ru-RU" sz="1800" i="1">
-                              <a:solidFill>
-                                <a:srgbClr val="000000"/>
-                              </a:solidFill>
-                              <a:effectLst/>
-                              <a:latin typeface="Cambria Math" panose="02040503050406030204" pitchFamily="18" charset="0"/>
-                              <a:ea typeface="Calibri" panose="020F0502020204030204" pitchFamily="34" charset="0"/>
-                              <a:cs typeface="Times New Roman" panose="02020603050405020304" pitchFamily="18" charset="0"/>
-                            </a:rPr>
-                            <m:t>=1</m:t>
-                          </m:r>
-                        </m:sub>
-                        <m:sup>
-                          <m:r>
-                            <a:rPr lang="ru-RU" sz="1800" i="1">
-                              <a:solidFill>
-                                <a:srgbClr val="000000"/>
-                              </a:solidFill>
-                              <a:effectLst/>
-                              <a:latin typeface="Cambria Math" panose="02040503050406030204" pitchFamily="18" charset="0"/>
-                              <a:ea typeface="Calibri" panose="020F0502020204030204" pitchFamily="34" charset="0"/>
-                              <a:cs typeface="Times New Roman" panose="02020603050405020304" pitchFamily="18" charset="0"/>
-                            </a:rPr>
-                            <m:t>𝑝</m:t>
-                          </m:r>
-                        </m:sup>
-                        <m:e>
-                          <m:sSub>
-                            <m:sSubPr>
-                              <m:ctrlPr>
-                                <a:rPr lang="en-US" i="1">
-                                  <a:effectLst/>
-                                  <a:latin typeface="Cambria Math" panose="02040503050406030204" pitchFamily="18" charset="0"/>
-                                </a:rPr>
-                              </m:ctrlPr>
-                            </m:sSubPr>
-                            <m:e>
-                              <m:r>
-                                <a:rPr lang="ru-RU" sz="1800" i="1">
-                                  <a:solidFill>
-                                    <a:srgbClr val="000000"/>
-                                  </a:solidFill>
-                                  <a:effectLst/>
-                                  <a:latin typeface="Cambria Math" panose="02040503050406030204" pitchFamily="18" charset="0"/>
-                                  <a:ea typeface="Calibri" panose="020F0502020204030204" pitchFamily="34" charset="0"/>
-                                  <a:cs typeface="Times New Roman" panose="02020603050405020304" pitchFamily="18" charset="0"/>
-                                </a:rPr>
-                                <m:t>𝑏</m:t>
-                              </m:r>
-                            </m:e>
-                            <m:sub>
-                              <m:r>
-                                <a:rPr lang="ru-RU" sz="1800" i="1">
-                                  <a:solidFill>
-                                    <a:srgbClr val="000000"/>
-                                  </a:solidFill>
-                                  <a:effectLst/>
-                                  <a:latin typeface="Cambria Math" panose="02040503050406030204" pitchFamily="18" charset="0"/>
-                                  <a:ea typeface="Calibri" panose="020F0502020204030204" pitchFamily="34" charset="0"/>
-                                  <a:cs typeface="Times New Roman" panose="02020603050405020304" pitchFamily="18" charset="0"/>
-                                </a:rPr>
-                                <m:t>𝑗</m:t>
-                              </m:r>
-                            </m:sub>
-                          </m:sSub>
-                        </m:e>
-                      </m:nary>
-                      <m:r>
-                        <a:rPr lang="ru-RU" sz="1800" i="1">
-                          <a:solidFill>
-                            <a:srgbClr val="000000"/>
-                          </a:solidFill>
-                          <a:effectLst/>
-                          <a:latin typeface="Cambria Math" panose="02040503050406030204" pitchFamily="18" charset="0"/>
-                          <a:ea typeface="Calibri" panose="020F0502020204030204" pitchFamily="34" charset="0"/>
-                          <a:cs typeface="Times New Roman" panose="02020603050405020304" pitchFamily="18" charset="0"/>
-                        </a:rPr>
-                        <m:t>&lt;1</m:t>
-                      </m:r>
-                    </m:oMath>
-                  </m:oMathPara>
-                </a14:m>
-                <a:endParaRPr lang="en-US" dirty="0"/>
-              </a:p>
-            </p:txBody>
-          </p:sp>
-        </mc:Choice>
-        <mc:Fallback xmlns="">
-          <p:sp>
-            <p:nvSpPr>
-              <p:cNvPr id="29" name="TextBox 28">
-                <a:extLst>
-                  <a:ext uri="{FF2B5EF4-FFF2-40B4-BE49-F238E27FC236}">
-                    <a16:creationId xmlns:a16="http://schemas.microsoft.com/office/drawing/2014/main" id="{9BF045A3-B092-46A4-BD4E-DBB83804F9A5}"/>
-                  </a:ext>
-                </a:extLst>
-              </p:cNvPr>
-              <p:cNvSpPr txBox="1">
-                <a:spLocks noRot="1" noChangeAspect="1" noMove="1" noResize="1" noEditPoints="1" noAdjustHandles="1" noChangeArrowheads="1" noChangeShapeType="1" noTextEdit="1"/>
-              </p:cNvSpPr>
-              <p:nvPr/>
-            </p:nvSpPr>
-            <p:spPr>
-              <a:xfrm>
-                <a:off x="5379144" y="3332035"/>
-                <a:ext cx="6206836" cy="1667380"/>
-              </a:xfrm>
-              <a:prstGeom prst="rect">
-                <a:avLst/>
-              </a:prstGeom>
-              <a:blipFill>
-                <a:blip r:embed="rId6"/>
-                <a:stretch>
-                  <a:fillRect/>
-                </a:stretch>
-              </a:blipFill>
-            </p:spPr>
-            <p:txBody>
-              <a:bodyPr/>
-              <a:lstStyle/>
-              <a:p>
-                <a:r>
-                  <a:rPr lang="en-US">
-                    <a:noFill/>
-                  </a:rPr>
-                  <a:t> </a:t>
-                </a:r>
-              </a:p>
-            </p:txBody>
-          </p:sp>
-        </mc:Fallback>
-      </mc:AlternateContent>
-      <p:sp>
-        <p:nvSpPr>
-          <p:cNvPr id="30" name="TextBox 29">
-            <a:extLst>
-              <a:ext uri="{FF2B5EF4-FFF2-40B4-BE49-F238E27FC236}">
-                <a16:creationId xmlns:a16="http://schemas.microsoft.com/office/drawing/2014/main" id="{D6AA1264-9D23-477D-B90D-481AC4C68A05}"/>
-              </a:ext>
-            </a:extLst>
-          </p:cNvPr>
-          <p:cNvSpPr txBox="1"/>
-          <p:nvPr/>
-        </p:nvSpPr>
-        <p:spPr>
-          <a:xfrm>
-            <a:off x="8055425" y="5017598"/>
-            <a:ext cx="854273" cy="369332"/>
-          </a:xfrm>
-          <a:prstGeom prst="rect">
-            <a:avLst/>
-          </a:prstGeom>
-          <a:noFill/>
-        </p:spPr>
-        <p:txBody>
-          <a:bodyPr wrap="none" rtlCol="0">
-            <a:spAutoFit/>
-          </a:bodyPr>
-          <a:lstStyle/>
-          <a:p>
-            <a:r>
-              <a:rPr lang="en-US" dirty="0"/>
-              <a:t>GARCH</a:t>
             </a:r>
           </a:p>
         </p:txBody>

</xml_diff>